<commit_message>
major changes, suggestions by @anjaf
</commit_message>
<xml_diff>
--- a/experimental-design/design-plots.pptx
+++ b/experimental-design/design-plots.pptx
@@ -5,7 +5,8 @@
     <p:sldMasterId id="2147483648" r:id="rId1"/>
   </p:sldMasterIdLst>
   <p:sldIdLst>
-    <p:sldId id="256" r:id="rId2"/>
+    <p:sldId id="257" r:id="rId2"/>
+    <p:sldId id="256" r:id="rId3"/>
   </p:sldIdLst>
   <p:sldSz cx="9144000" cy="6858000" type="screen4x3"/>
   <p:notesSz cx="6858000" cy="9144000"/>
@@ -104,6 +105,11 @@
       </a:defRPr>
     </a:lvl9pPr>
   </p:defaultTextStyle>
+  <p:extLst>
+    <p:ext uri="{EFAFB233-063F-42B5-8137-9DF3F51BA10A}">
+      <p15:sldGuideLst xmlns:p15="http://schemas.microsoft.com/office/powerpoint/2012/main"/>
+    </p:ext>
+  </p:extLst>
 </p:presentation>
 </file>
 
@@ -288,7 +294,7 @@
           <a:p>
             <a:fld id="{97F1CE15-3475-4A4B-A4B6-6E0EFF0BADFA}" type="datetimeFigureOut">
               <a:rPr lang="en-US" smtClean="0"/>
-              <a:t>2/21/20</a:t>
+              <a:t>3/5/20</a:t>
             </a:fld>
             <a:endParaRPr lang="en-US"/>
           </a:p>
@@ -458,7 +464,7 @@
           <a:p>
             <a:fld id="{97F1CE15-3475-4A4B-A4B6-6E0EFF0BADFA}" type="datetimeFigureOut">
               <a:rPr lang="en-US" smtClean="0"/>
-              <a:t>2/21/20</a:t>
+              <a:t>3/5/20</a:t>
             </a:fld>
             <a:endParaRPr lang="en-US"/>
           </a:p>
@@ -638,7 +644,7 @@
           <a:p>
             <a:fld id="{97F1CE15-3475-4A4B-A4B6-6E0EFF0BADFA}" type="datetimeFigureOut">
               <a:rPr lang="en-US" smtClean="0"/>
-              <a:t>2/21/20</a:t>
+              <a:t>3/5/20</a:t>
             </a:fld>
             <a:endParaRPr lang="en-US"/>
           </a:p>
@@ -1081,7 +1087,7 @@
           <a:p>
             <a:fld id="{97F1CE15-3475-4A4B-A4B6-6E0EFF0BADFA}" type="datetimeFigureOut">
               <a:rPr lang="en-US" smtClean="0"/>
-              <a:t>2/21/20</a:t>
+              <a:t>3/5/20</a:t>
             </a:fld>
             <a:endParaRPr lang="en-US"/>
           </a:p>
@@ -1327,7 +1333,7 @@
           <a:p>
             <a:fld id="{97F1CE15-3475-4A4B-A4B6-6E0EFF0BADFA}" type="datetimeFigureOut">
               <a:rPr lang="en-US" smtClean="0"/>
-              <a:t>2/21/20</a:t>
+              <a:t>3/5/20</a:t>
             </a:fld>
             <a:endParaRPr lang="en-US"/>
           </a:p>
@@ -1615,7 +1621,7 @@
           <a:p>
             <a:fld id="{97F1CE15-3475-4A4B-A4B6-6E0EFF0BADFA}" type="datetimeFigureOut">
               <a:rPr lang="en-US" smtClean="0"/>
-              <a:t>2/21/20</a:t>
+              <a:t>3/5/20</a:t>
             </a:fld>
             <a:endParaRPr lang="en-US"/>
           </a:p>
@@ -2037,7 +2043,7 @@
           <a:p>
             <a:fld id="{97F1CE15-3475-4A4B-A4B6-6E0EFF0BADFA}" type="datetimeFigureOut">
               <a:rPr lang="en-US" smtClean="0"/>
-              <a:t>2/21/20</a:t>
+              <a:t>3/5/20</a:t>
             </a:fld>
             <a:endParaRPr lang="en-US"/>
           </a:p>
@@ -2155,7 +2161,7 @@
           <a:p>
             <a:fld id="{97F1CE15-3475-4A4B-A4B6-6E0EFF0BADFA}" type="datetimeFigureOut">
               <a:rPr lang="en-US" smtClean="0"/>
-              <a:t>2/21/20</a:t>
+              <a:t>3/5/20</a:t>
             </a:fld>
             <a:endParaRPr lang="en-US"/>
           </a:p>
@@ -2250,7 +2256,7 @@
           <a:p>
             <a:fld id="{97F1CE15-3475-4A4B-A4B6-6E0EFF0BADFA}" type="datetimeFigureOut">
               <a:rPr lang="en-US" smtClean="0"/>
-              <a:t>2/21/20</a:t>
+              <a:t>3/5/20</a:t>
             </a:fld>
             <a:endParaRPr lang="en-US"/>
           </a:p>
@@ -2527,7 +2533,7 @@
           <a:p>
             <a:fld id="{97F1CE15-3475-4A4B-A4B6-6E0EFF0BADFA}" type="datetimeFigureOut">
               <a:rPr lang="en-US" smtClean="0"/>
-              <a:t>2/21/20</a:t>
+              <a:t>3/5/20</a:t>
             </a:fld>
             <a:endParaRPr lang="en-US"/>
           </a:p>
@@ -2784,7 +2790,7 @@
           <a:p>
             <a:fld id="{97F1CE15-3475-4A4B-A4B6-6E0EFF0BADFA}" type="datetimeFigureOut">
               <a:rPr lang="en-US" smtClean="0"/>
-              <a:t>2/21/20</a:t>
+              <a:t>3/5/20</a:t>
             </a:fld>
             <a:endParaRPr lang="en-US"/>
           </a:p>
@@ -2997,7 +3003,7 @@
           <a:p>
             <a:fld id="{97F1CE15-3475-4A4B-A4B6-6E0EFF0BADFA}" type="datetimeFigureOut">
               <a:rPr lang="en-US" smtClean="0"/>
-              <a:t>2/21/20</a:t>
+              <a:t>3/5/20</a:t>
             </a:fld>
             <a:endParaRPr lang="en-US"/>
           </a:p>
@@ -3373,6 +3379,621 @@
           <a:chExt cx="0" cy="0"/>
         </a:xfrm>
       </p:grpSpPr>
+      <p:grpSp>
+        <p:nvGrpSpPr>
+          <p:cNvPr id="30" name="Group 29">
+            <a:extLst>
+              <a:ext uri="{FF2B5EF4-FFF2-40B4-BE49-F238E27FC236}">
+                <a16:creationId xmlns:a16="http://schemas.microsoft.com/office/drawing/2014/main" id="{5E9DD1F8-F2B9-4645-8AEC-EAE5630E9454}"/>
+              </a:ext>
+            </a:extLst>
+          </p:cNvPr>
+          <p:cNvGrpSpPr/>
+          <p:nvPr/>
+        </p:nvGrpSpPr>
+        <p:grpSpPr>
+          <a:xfrm>
+            <a:off x="616527" y="833823"/>
+            <a:ext cx="8567112" cy="5278340"/>
+            <a:chOff x="616527" y="833823"/>
+            <a:chExt cx="8567112" cy="5278340"/>
+          </a:xfrm>
+        </p:grpSpPr>
+        <p:grpSp>
+          <p:nvGrpSpPr>
+            <p:cNvPr id="6" name="Group 5">
+              <a:extLst>
+                <a:ext uri="{FF2B5EF4-FFF2-40B4-BE49-F238E27FC236}">
+                  <a16:creationId xmlns:a16="http://schemas.microsoft.com/office/drawing/2014/main" id="{F98B0F94-1198-3B4C-B936-488C0C2E8980}"/>
+                </a:ext>
+              </a:extLst>
+            </p:cNvPr>
+            <p:cNvGrpSpPr/>
+            <p:nvPr/>
+          </p:nvGrpSpPr>
+          <p:grpSpPr>
+            <a:xfrm>
+              <a:off x="616527" y="1011381"/>
+              <a:ext cx="1593273" cy="1343891"/>
+              <a:chOff x="616527" y="1011381"/>
+              <a:chExt cx="1593273" cy="1343891"/>
+            </a:xfrm>
+          </p:grpSpPr>
+          <p:sp>
+            <p:nvSpPr>
+              <p:cNvPr id="4" name="Rectangle 3">
+                <a:extLst>
+                  <a:ext uri="{FF2B5EF4-FFF2-40B4-BE49-F238E27FC236}">
+                    <a16:creationId xmlns:a16="http://schemas.microsoft.com/office/drawing/2014/main" id="{740EC8F6-785A-4F42-87F0-7D1360C3976E}"/>
+                  </a:ext>
+                </a:extLst>
+              </p:cNvPr>
+              <p:cNvSpPr/>
+              <p:nvPr/>
+            </p:nvSpPr>
+            <p:spPr>
+              <a:xfrm>
+                <a:off x="775854" y="1011381"/>
+                <a:ext cx="1274618" cy="1343891"/>
+              </a:xfrm>
+              <a:prstGeom prst="rect">
+                <a:avLst/>
+              </a:prstGeom>
+              <a:noFill/>
+              <a:ln>
+                <a:prstDash val="lgDash"/>
+              </a:ln>
+            </p:spPr>
+            <p:style>
+              <a:lnRef idx="1">
+                <a:schemeClr val="accent1"/>
+              </a:lnRef>
+              <a:fillRef idx="3">
+                <a:schemeClr val="accent1"/>
+              </a:fillRef>
+              <a:effectRef idx="2">
+                <a:schemeClr val="accent1"/>
+              </a:effectRef>
+              <a:fontRef idx="minor">
+                <a:schemeClr val="lt1"/>
+              </a:fontRef>
+            </p:style>
+            <p:txBody>
+              <a:bodyPr rtlCol="0" anchor="ctr"/>
+              <a:lstStyle/>
+              <a:p>
+                <a:pPr algn="ctr"/>
+                <a:endParaRPr lang="en-US" dirty="0"/>
+              </a:p>
+            </p:txBody>
+          </p:sp>
+          <p:sp>
+            <p:nvSpPr>
+              <p:cNvPr id="5" name="TextBox 4">
+                <a:extLst>
+                  <a:ext uri="{FF2B5EF4-FFF2-40B4-BE49-F238E27FC236}">
+                    <a16:creationId xmlns:a16="http://schemas.microsoft.com/office/drawing/2014/main" id="{36DB6B81-6192-4845-AAAE-3AD9BFE7086D}"/>
+                  </a:ext>
+                </a:extLst>
+              </p:cNvPr>
+              <p:cNvSpPr txBox="1"/>
+              <p:nvPr/>
+            </p:nvSpPr>
+            <p:spPr>
+              <a:xfrm>
+                <a:off x="616527" y="1221662"/>
+                <a:ext cx="1593273" cy="923330"/>
+              </a:xfrm>
+              <a:prstGeom prst="rect">
+                <a:avLst/>
+              </a:prstGeom>
+              <a:noFill/>
+            </p:spPr>
+            <p:txBody>
+              <a:bodyPr wrap="square" rtlCol="0">
+                <a:spAutoFit/>
+              </a:bodyPr>
+              <a:lstStyle/>
+              <a:p>
+                <a:pPr algn="ctr"/>
+                <a:r>
+                  <a:rPr lang="en-US" dirty="0"/>
+                  <a:t>Dataset general description</a:t>
+                </a:r>
+              </a:p>
+            </p:txBody>
+          </p:sp>
+        </p:grpSp>
+        <p:sp>
+          <p:nvSpPr>
+            <p:cNvPr id="7" name="Multi-document 6">
+              <a:extLst>
+                <a:ext uri="{FF2B5EF4-FFF2-40B4-BE49-F238E27FC236}">
+                  <a16:creationId xmlns:a16="http://schemas.microsoft.com/office/drawing/2014/main" id="{61656411-CF53-CD41-9656-764211C73227}"/>
+                </a:ext>
+              </a:extLst>
+            </p:cNvPr>
+            <p:cNvSpPr/>
+            <p:nvPr/>
+          </p:nvSpPr>
+          <p:spPr>
+            <a:xfrm>
+              <a:off x="5400131" y="833823"/>
+              <a:ext cx="1524000" cy="1717964"/>
+            </a:xfrm>
+            <a:prstGeom prst="flowChartMultidocument">
+              <a:avLst/>
+            </a:prstGeom>
+            <a:solidFill>
+              <a:schemeClr val="bg1"/>
+            </a:solidFill>
+            <a:ln>
+              <a:prstDash val="lgDash"/>
+            </a:ln>
+          </p:spPr>
+          <p:style>
+            <a:lnRef idx="1">
+              <a:schemeClr val="accent1"/>
+            </a:lnRef>
+            <a:fillRef idx="3">
+              <a:schemeClr val="accent1"/>
+            </a:fillRef>
+            <a:effectRef idx="2">
+              <a:schemeClr val="accent1"/>
+            </a:effectRef>
+            <a:fontRef idx="minor">
+              <a:schemeClr val="lt1"/>
+            </a:fontRef>
+          </p:style>
+          <p:txBody>
+            <a:bodyPr rtlCol="0" anchor="ctr"/>
+            <a:lstStyle/>
+            <a:p>
+              <a:pPr algn="ctr"/>
+              <a:r>
+                <a:rPr lang="en-US" dirty="0">
+                  <a:solidFill>
+                    <a:schemeClr val="tx1"/>
+                  </a:solidFill>
+                </a:rPr>
+                <a:t>Data Files </a:t>
+              </a:r>
+            </a:p>
+          </p:txBody>
+        </p:sp>
+        <p:sp>
+          <p:nvSpPr>
+            <p:cNvPr id="10" name="TextBox 9">
+              <a:extLst>
+                <a:ext uri="{FF2B5EF4-FFF2-40B4-BE49-F238E27FC236}">
+                  <a16:creationId xmlns:a16="http://schemas.microsoft.com/office/drawing/2014/main" id="{D14E5AC1-1374-4941-9FB1-8EC224F823E7}"/>
+                </a:ext>
+              </a:extLst>
+            </p:cNvPr>
+            <p:cNvSpPr txBox="1"/>
+            <p:nvPr/>
+          </p:nvSpPr>
+          <p:spPr>
+            <a:xfrm>
+              <a:off x="7055749" y="833823"/>
+              <a:ext cx="2127890" cy="1477328"/>
+            </a:xfrm>
+            <a:prstGeom prst="rect">
+              <a:avLst/>
+            </a:prstGeom>
+            <a:noFill/>
+          </p:spPr>
+          <p:txBody>
+            <a:bodyPr wrap="none" rtlCol="0">
+              <a:spAutoFit/>
+            </a:bodyPr>
+            <a:lstStyle/>
+            <a:p>
+              <a:pPr marL="285750" indent="-285750">
+                <a:buFont typeface="Arial" panose="020B0604020202020204" pitchFamily="34" charset="0"/>
+                <a:buChar char="•"/>
+              </a:pPr>
+              <a:r>
+                <a:rPr lang="en-US" dirty="0"/>
+                <a:t>Instrument files</a:t>
+              </a:r>
+            </a:p>
+            <a:p>
+              <a:pPr marL="285750" indent="-285750">
+                <a:buFont typeface="Arial" panose="020B0604020202020204" pitchFamily="34" charset="0"/>
+                <a:buChar char="•"/>
+              </a:pPr>
+              <a:r>
+                <a:rPr lang="en-US" dirty="0"/>
+                <a:t>Result files</a:t>
+              </a:r>
+            </a:p>
+            <a:p>
+              <a:pPr marL="285750" indent="-285750">
+                <a:buFont typeface="Arial" panose="020B0604020202020204" pitchFamily="34" charset="0"/>
+                <a:buChar char="•"/>
+              </a:pPr>
+              <a:r>
+                <a:rPr lang="en-US" dirty="0"/>
+                <a:t>Intermediate files</a:t>
+              </a:r>
+            </a:p>
+            <a:p>
+              <a:pPr marL="285750" indent="-285750">
+                <a:buFont typeface="Arial" panose="020B0604020202020204" pitchFamily="34" charset="0"/>
+                <a:buChar char="•"/>
+              </a:pPr>
+              <a:r>
+                <a:rPr lang="en-US" dirty="0"/>
+                <a:t>Plots</a:t>
+              </a:r>
+            </a:p>
+            <a:p>
+              <a:pPr marL="285750" indent="-285750">
+                <a:buFont typeface="Arial" panose="020B0604020202020204" pitchFamily="34" charset="0"/>
+                <a:buChar char="•"/>
+              </a:pPr>
+              <a:r>
+                <a:rPr lang="en-US" dirty="0"/>
+                <a:t>config files</a:t>
+              </a:r>
+            </a:p>
+          </p:txBody>
+        </p:sp>
+        <p:pic>
+          <p:nvPicPr>
+            <p:cNvPr id="15" name="Picture 14" descr="A screenshot of a social media post&#10;&#10;Description automatically generated">
+              <a:extLst>
+                <a:ext uri="{FF2B5EF4-FFF2-40B4-BE49-F238E27FC236}">
+                  <a16:creationId xmlns:a16="http://schemas.microsoft.com/office/drawing/2014/main" id="{C3C6EDA4-D690-5540-A8DE-CFE9CAE1FEE8}"/>
+                </a:ext>
+              </a:extLst>
+            </p:cNvPr>
+            <p:cNvPicPr>
+              <a:picLocks noChangeAspect="1"/>
+            </p:cNvPicPr>
+            <p:nvPr/>
+          </p:nvPicPr>
+          <p:blipFill>
+            <a:blip r:embed="rId2"/>
+            <a:stretch>
+              <a:fillRect/>
+            </a:stretch>
+          </p:blipFill>
+          <p:spPr>
+            <a:xfrm>
+              <a:off x="2209800" y="3572163"/>
+              <a:ext cx="3098800" cy="2540000"/>
+            </a:xfrm>
+            <a:prstGeom prst="rect">
+              <a:avLst/>
+            </a:prstGeom>
+          </p:spPr>
+        </p:pic>
+        <p:grpSp>
+          <p:nvGrpSpPr>
+            <p:cNvPr id="16" name="Group 15">
+              <a:extLst>
+                <a:ext uri="{FF2B5EF4-FFF2-40B4-BE49-F238E27FC236}">
+                  <a16:creationId xmlns:a16="http://schemas.microsoft.com/office/drawing/2014/main" id="{1C48CDDA-17A8-8D4D-B53E-360502E5D8CB}"/>
+                </a:ext>
+              </a:extLst>
+            </p:cNvPr>
+            <p:cNvGrpSpPr/>
+            <p:nvPr/>
+          </p:nvGrpSpPr>
+          <p:grpSpPr>
+            <a:xfrm>
+              <a:off x="3082963" y="1011381"/>
+              <a:ext cx="1593273" cy="1343891"/>
+              <a:chOff x="616527" y="1011381"/>
+              <a:chExt cx="1593273" cy="1343891"/>
+            </a:xfrm>
+          </p:grpSpPr>
+          <p:sp>
+            <p:nvSpPr>
+              <p:cNvPr id="17" name="Rectangle 16">
+                <a:extLst>
+                  <a:ext uri="{FF2B5EF4-FFF2-40B4-BE49-F238E27FC236}">
+                    <a16:creationId xmlns:a16="http://schemas.microsoft.com/office/drawing/2014/main" id="{B46313A6-EA08-074A-A575-6AC64CFD4076}"/>
+                  </a:ext>
+                </a:extLst>
+              </p:cNvPr>
+              <p:cNvSpPr/>
+              <p:nvPr/>
+            </p:nvSpPr>
+            <p:spPr>
+              <a:xfrm>
+                <a:off x="775854" y="1011381"/>
+                <a:ext cx="1274618" cy="1343891"/>
+              </a:xfrm>
+              <a:prstGeom prst="rect">
+                <a:avLst/>
+              </a:prstGeom>
+              <a:noFill/>
+              <a:ln w="28575">
+                <a:solidFill>
+                  <a:schemeClr val="accent3">
+                    <a:lumMod val="50000"/>
+                  </a:schemeClr>
+                </a:solidFill>
+                <a:prstDash val="lgDash"/>
+              </a:ln>
+            </p:spPr>
+            <p:style>
+              <a:lnRef idx="1">
+                <a:schemeClr val="accent1"/>
+              </a:lnRef>
+              <a:fillRef idx="3">
+                <a:schemeClr val="accent1"/>
+              </a:fillRef>
+              <a:effectRef idx="2">
+                <a:schemeClr val="accent1"/>
+              </a:effectRef>
+              <a:fontRef idx="minor">
+                <a:schemeClr val="lt1"/>
+              </a:fontRef>
+            </p:style>
+            <p:txBody>
+              <a:bodyPr rtlCol="0" anchor="ctr"/>
+              <a:lstStyle/>
+              <a:p>
+                <a:pPr algn="ctr"/>
+                <a:endParaRPr lang="en-US" dirty="0"/>
+              </a:p>
+            </p:txBody>
+          </p:sp>
+          <p:sp>
+            <p:nvSpPr>
+              <p:cNvPr id="18" name="TextBox 17">
+                <a:extLst>
+                  <a:ext uri="{FF2B5EF4-FFF2-40B4-BE49-F238E27FC236}">
+                    <a16:creationId xmlns:a16="http://schemas.microsoft.com/office/drawing/2014/main" id="{45145D21-0DAF-5048-8F2D-795EA13D2973}"/>
+                  </a:ext>
+                </a:extLst>
+              </p:cNvPr>
+              <p:cNvSpPr txBox="1"/>
+              <p:nvPr/>
+            </p:nvSpPr>
+            <p:spPr>
+              <a:xfrm>
+                <a:off x="616527" y="1221662"/>
+                <a:ext cx="1593273" cy="923330"/>
+              </a:xfrm>
+              <a:prstGeom prst="rect">
+                <a:avLst/>
+              </a:prstGeom>
+              <a:noFill/>
+            </p:spPr>
+            <p:txBody>
+              <a:bodyPr wrap="square" rtlCol="0">
+                <a:spAutoFit/>
+              </a:bodyPr>
+              <a:lstStyle/>
+              <a:p>
+                <a:pPr algn="ctr"/>
+                <a:r>
+                  <a:rPr lang="en-US" dirty="0"/>
+                  <a:t>Sample </a:t>
+                </a:r>
+              </a:p>
+              <a:p>
+                <a:pPr algn="ctr"/>
+                <a:r>
+                  <a:rPr lang="en-US" dirty="0"/>
+                  <a:t>To</a:t>
+                </a:r>
+              </a:p>
+              <a:p>
+                <a:pPr algn="ctr"/>
+                <a:r>
+                  <a:rPr lang="en-US" dirty="0"/>
+                  <a:t>Data files</a:t>
+                </a:r>
+              </a:p>
+            </p:txBody>
+          </p:sp>
+        </p:grpSp>
+        <p:cxnSp>
+          <p:nvCxnSpPr>
+            <p:cNvPr id="20" name="Straight Connector 19">
+              <a:extLst>
+                <a:ext uri="{FF2B5EF4-FFF2-40B4-BE49-F238E27FC236}">
+                  <a16:creationId xmlns:a16="http://schemas.microsoft.com/office/drawing/2014/main" id="{94537B39-5A11-F346-BFDA-B2A9EB631C15}"/>
+                </a:ext>
+              </a:extLst>
+            </p:cNvPr>
+            <p:cNvCxnSpPr>
+              <a:cxnSpLocks/>
+              <a:stCxn id="17" idx="2"/>
+            </p:cNvCxnSpPr>
+            <p:nvPr/>
+          </p:nvCxnSpPr>
+          <p:spPr>
+            <a:xfrm flipH="1">
+              <a:off x="2050473" y="2355272"/>
+              <a:ext cx="1829126" cy="1440873"/>
+            </a:xfrm>
+            <a:prstGeom prst="line">
+              <a:avLst/>
+            </a:prstGeom>
+            <a:ln>
+              <a:prstDash val="lgDash"/>
+            </a:ln>
+          </p:spPr>
+          <p:style>
+            <a:lnRef idx="2">
+              <a:schemeClr val="accent1"/>
+            </a:lnRef>
+            <a:fillRef idx="0">
+              <a:schemeClr val="accent1"/>
+            </a:fillRef>
+            <a:effectRef idx="1">
+              <a:schemeClr val="accent1"/>
+            </a:effectRef>
+            <a:fontRef idx="minor">
+              <a:schemeClr val="tx1"/>
+            </a:fontRef>
+          </p:style>
+        </p:cxnSp>
+        <p:cxnSp>
+          <p:nvCxnSpPr>
+            <p:cNvPr id="21" name="Straight Connector 20">
+              <a:extLst>
+                <a:ext uri="{FF2B5EF4-FFF2-40B4-BE49-F238E27FC236}">
+                  <a16:creationId xmlns:a16="http://schemas.microsoft.com/office/drawing/2014/main" id="{6E13DADF-26F8-A44C-A60E-C7D580F7B891}"/>
+                </a:ext>
+              </a:extLst>
+            </p:cNvPr>
+            <p:cNvCxnSpPr>
+              <a:cxnSpLocks/>
+              <a:stCxn id="17" idx="2"/>
+            </p:cNvCxnSpPr>
+            <p:nvPr/>
+          </p:nvCxnSpPr>
+          <p:spPr>
+            <a:xfrm>
+              <a:off x="3879599" y="2355272"/>
+              <a:ext cx="1829127" cy="1427171"/>
+            </a:xfrm>
+            <a:prstGeom prst="line">
+              <a:avLst/>
+            </a:prstGeom>
+            <a:ln>
+              <a:prstDash val="lgDash"/>
+            </a:ln>
+          </p:spPr>
+          <p:style>
+            <a:lnRef idx="2">
+              <a:schemeClr val="accent1"/>
+            </a:lnRef>
+            <a:fillRef idx="0">
+              <a:schemeClr val="accent1"/>
+            </a:fillRef>
+            <a:effectRef idx="1">
+              <a:schemeClr val="accent1"/>
+            </a:effectRef>
+            <a:fontRef idx="minor">
+              <a:schemeClr val="tx1"/>
+            </a:fontRef>
+          </p:style>
+        </p:cxnSp>
+        <p:cxnSp>
+          <p:nvCxnSpPr>
+            <p:cNvPr id="26" name="Straight Arrow Connector 25">
+              <a:extLst>
+                <a:ext uri="{FF2B5EF4-FFF2-40B4-BE49-F238E27FC236}">
+                  <a16:creationId xmlns:a16="http://schemas.microsoft.com/office/drawing/2014/main" id="{B0572B2D-CA76-9944-B011-AB81785BB568}"/>
+                </a:ext>
+              </a:extLst>
+            </p:cNvPr>
+            <p:cNvCxnSpPr>
+              <a:stCxn id="5" idx="3"/>
+              <a:endCxn id="18" idx="1"/>
+            </p:cNvCxnSpPr>
+            <p:nvPr/>
+          </p:nvCxnSpPr>
+          <p:spPr>
+            <a:xfrm>
+              <a:off x="2209800" y="1683327"/>
+              <a:ext cx="873163" cy="0"/>
+            </a:xfrm>
+            <a:prstGeom prst="straightConnector1">
+              <a:avLst/>
+            </a:prstGeom>
+            <a:ln>
+              <a:tailEnd type="triangle"/>
+            </a:ln>
+          </p:spPr>
+          <p:style>
+            <a:lnRef idx="2">
+              <a:schemeClr val="accent1"/>
+            </a:lnRef>
+            <a:fillRef idx="0">
+              <a:schemeClr val="accent1"/>
+            </a:fillRef>
+            <a:effectRef idx="1">
+              <a:schemeClr val="accent1"/>
+            </a:effectRef>
+            <a:fontRef idx="minor">
+              <a:schemeClr val="tx1"/>
+            </a:fontRef>
+          </p:style>
+        </p:cxnSp>
+        <p:cxnSp>
+          <p:nvCxnSpPr>
+            <p:cNvPr id="27" name="Straight Arrow Connector 26">
+              <a:extLst>
+                <a:ext uri="{FF2B5EF4-FFF2-40B4-BE49-F238E27FC236}">
+                  <a16:creationId xmlns:a16="http://schemas.microsoft.com/office/drawing/2014/main" id="{688703D2-7BC7-5B4E-8FF2-3A979D880A8F}"/>
+                </a:ext>
+              </a:extLst>
+            </p:cNvPr>
+            <p:cNvCxnSpPr>
+              <a:cxnSpLocks/>
+              <a:stCxn id="18" idx="3"/>
+              <a:endCxn id="7" idx="1"/>
+            </p:cNvCxnSpPr>
+            <p:nvPr/>
+          </p:nvCxnSpPr>
+          <p:spPr>
+            <a:xfrm>
+              <a:off x="4676236" y="1683327"/>
+              <a:ext cx="723895" cy="9478"/>
+            </a:xfrm>
+            <a:prstGeom prst="straightConnector1">
+              <a:avLst/>
+            </a:prstGeom>
+            <a:ln>
+              <a:tailEnd type="triangle"/>
+            </a:ln>
+          </p:spPr>
+          <p:style>
+            <a:lnRef idx="2">
+              <a:schemeClr val="accent1"/>
+            </a:lnRef>
+            <a:fillRef idx="0">
+              <a:schemeClr val="accent1"/>
+            </a:fillRef>
+            <a:effectRef idx="1">
+              <a:schemeClr val="accent1"/>
+            </a:effectRef>
+            <a:fontRef idx="minor">
+              <a:schemeClr val="tx1"/>
+            </a:fontRef>
+          </p:style>
+        </p:cxnSp>
+      </p:grpSp>
+    </p:spTree>
+    <p:extLst>
+      <p:ext uri="{BB962C8B-B14F-4D97-AF65-F5344CB8AC3E}">
+        <p14:creationId xmlns:p14="http://schemas.microsoft.com/office/powerpoint/2010/main" val="1635607063"/>
+      </p:ext>
+    </p:extLst>
+  </p:cSld>
+  <p:clrMapOvr>
+    <a:masterClrMapping/>
+  </p:clrMapOvr>
+</p:sld>
+</file>
+
+<file path=ppt/slides/slide2.xml><?xml version="1.0" encoding="utf-8"?>
+<p:sld xmlns:a="http://schemas.openxmlformats.org/drawingml/2006/main" xmlns:r="http://schemas.openxmlformats.org/officeDocument/2006/relationships" xmlns:p="http://schemas.openxmlformats.org/presentationml/2006/main">
+  <p:cSld>
+    <p:spTree>
+      <p:nvGrpSpPr>
+        <p:cNvPr id="1" name=""/>
+        <p:cNvGrpSpPr/>
+        <p:nvPr/>
+      </p:nvGrpSpPr>
+      <p:grpSpPr>
+        <a:xfrm>
+          <a:off x="0" y="0"/>
+          <a:ext cx="0" cy="0"/>
+          <a:chOff x="0" y="0"/>
+          <a:chExt cx="0" cy="0"/>
+        </a:xfrm>
+      </p:grpSpPr>
       <p:graphicFrame>
         <p:nvGraphicFramePr>
           <p:cNvPr id="5" name="Table 4">
@@ -3388,7 +4009,7 @@
           <p:nvPr>
             <p:extLst>
               <p:ext uri="{D42A27DB-BD31-4B8C-83A1-F6EECF244321}">
-                <p14:modId xmlns:p14="http://schemas.microsoft.com/office/powerpoint/2010/main" val="2635212978"/>
+                <p14:modId xmlns:p14="http://schemas.microsoft.com/office/powerpoint/2010/main" val="3357475159"/>
               </p:ext>
             </p:extLst>
           </p:nvPr>
@@ -3404,63 +4025,70 @@
                 <a:tableStyleId>{5C22544A-7EE6-4342-B048-85BDC9FD1C3A}</a:tableStyleId>
               </a:tblPr>
               <a:tblGrid>
-                <a:gridCol w="656650">
+                <a:gridCol w="593785">
                   <a:extLst>
                     <a:ext uri="{9D8B030D-6E8A-4147-A177-3AD203B41FA5}">
                       <a16:colId xmlns:a16="http://schemas.microsoft.com/office/drawing/2014/main" val="2522687694"/>
                     </a:ext>
                   </a:extLst>
                 </a:gridCol>
-                <a:gridCol w="1270341">
+                <a:gridCol w="1073197">
                   <a:extLst>
                     <a:ext uri="{9D8B030D-6E8A-4147-A177-3AD203B41FA5}">
                       <a16:colId xmlns:a16="http://schemas.microsoft.com/office/drawing/2014/main" val="140013746"/>
                     </a:ext>
                   </a:extLst>
                 </a:gridCol>
-                <a:gridCol w="1104644">
+                <a:gridCol w="972308">
                   <a:extLst>
                     <a:ext uri="{9D8B030D-6E8A-4147-A177-3AD203B41FA5}">
                       <a16:colId xmlns:a16="http://schemas.microsoft.com/office/drawing/2014/main" val="4268493495"/>
                     </a:ext>
                   </a:extLst>
                 </a:gridCol>
-                <a:gridCol w="1221246">
+                <a:gridCol w="1127401">
                   <a:extLst>
                     <a:ext uri="{9D8B030D-6E8A-4147-A177-3AD203B41FA5}">
                       <a16:colId xmlns:a16="http://schemas.microsoft.com/office/drawing/2014/main" val="1509501435"/>
                     </a:ext>
                   </a:extLst>
                 </a:gridCol>
-                <a:gridCol w="208655">
+                <a:gridCol w="237147">
                   <a:extLst>
                     <a:ext uri="{9D8B030D-6E8A-4147-A177-3AD203B41FA5}">
                       <a16:colId xmlns:a16="http://schemas.microsoft.com/office/drawing/2014/main" val="3214207617"/>
                     </a:ext>
                   </a:extLst>
                 </a:gridCol>
-                <a:gridCol w="1258067">
+                <a:gridCol w="578680">
                   <a:extLst>
                     <a:ext uri="{9D8B030D-6E8A-4147-A177-3AD203B41FA5}">
-                      <a16:colId xmlns:a16="http://schemas.microsoft.com/office/drawing/2014/main" val="341129967"/>
+                      <a16:colId xmlns:a16="http://schemas.microsoft.com/office/drawing/2014/main" val="3396500543"/>
                     </a:ext>
                   </a:extLst>
                 </a:gridCol>
-                <a:gridCol w="1294888">
+                <a:gridCol w="1178528">
                   <a:extLst>
                     <a:ext uri="{9D8B030D-6E8A-4147-A177-3AD203B41FA5}">
                       <a16:colId xmlns:a16="http://schemas.microsoft.com/office/drawing/2014/main" val="1365130392"/>
                     </a:ext>
                   </a:extLst>
                 </a:gridCol>
-                <a:gridCol w="828484">
+                <a:gridCol w="931763">
+                  <a:extLst>
+                    <a:ext uri="{9D8B030D-6E8A-4147-A177-3AD203B41FA5}">
+                      <a16:colId xmlns:a16="http://schemas.microsoft.com/office/drawing/2014/main" val="1609997497"/>
+                    </a:ext>
+                  </a:extLst>
+                </a:gridCol>
+                <a:gridCol w="1319513">
                   <a:extLst>
                     <a:ext uri="{9D8B030D-6E8A-4147-A177-3AD203B41FA5}">
                       <a16:colId xmlns:a16="http://schemas.microsoft.com/office/drawing/2014/main" val="3991175573"/>
                     </a:ext>
                   </a:extLst>
                 </a:gridCol>
-                <a:gridCol w="1153740">
+                <a:gridCol w="984393">
                   <a:extLst>
                     <a:ext uri="{9D8B030D-6E8A-4147-A177-3AD203B41FA5}">
                       <a16:colId xmlns:a16="http://schemas.microsoft.com/office/drawing/2014/main" val="3922267556"/>
@@ -3483,7 +4111,7 @@
                         </a:spcAft>
                       </a:pPr>
                       <a:r>
-                        <a:rPr lang="en-US" sz="800" dirty="0"/>
+                        <a:rPr lang="en-US" sz="700" dirty="0"/>
                         <a:t>source name</a:t>
                       </a:r>
                     </a:p>
@@ -3504,7 +4132,7 @@
                         </a:spcAft>
                       </a:pPr>
                       <a:r>
-                        <a:rPr lang="en-US" sz="800" dirty="0"/>
+                        <a:rPr lang="en-US" sz="700" dirty="0"/>
                         <a:t>characteristics[organism]</a:t>
                       </a:r>
                     </a:p>
@@ -3525,7 +4153,7 @@
                         </a:spcAft>
                       </a:pPr>
                       <a:r>
-                        <a:rPr lang="en-US" sz="800" dirty="0"/>
+                        <a:rPr lang="en-US" sz="700" dirty="0"/>
                         <a:t>characteristics[disease]</a:t>
                       </a:r>
                     </a:p>
@@ -3546,7 +4174,7 @@
                         </a:spcAft>
                       </a:pPr>
                       <a:r>
-                        <a:rPr lang="en-US" sz="800" dirty="0"/>
+                        <a:rPr lang="en-US" sz="700" dirty="0"/>
                         <a:t>characteristics[phenotype]</a:t>
                       </a:r>
                     </a:p>
@@ -3567,7 +4195,7 @@
                         </a:spcAft>
                       </a:pPr>
                       <a:r>
-                        <a:rPr lang="en-US" sz="800" dirty="0"/>
+                        <a:rPr lang="en-US" sz="700" dirty="0"/>
                         <a:t>…</a:t>
                       </a:r>
                     </a:p>
@@ -3588,7 +4216,88 @@
                         </a:spcAft>
                       </a:pPr>
                       <a:r>
-                        <a:rPr lang="en-US" sz="800" dirty="0"/>
+                        <a:rPr lang="en-US" sz="700" dirty="0"/>
+                        <a:t>Assay name</a:t>
+                      </a:r>
+                    </a:p>
+                  </a:txBody>
+                  <a:tcPr marL="36000" marR="36000">
+                    <a:solidFill>
+                      <a:schemeClr val="accent3">
+                        <a:lumMod val="75000"/>
+                      </a:schemeClr>
+                    </a:solidFill>
+                  </a:tcPr>
+                </a:tc>
+                <a:tc>
+                  <a:txBody>
+                    <a:bodyPr/>
+                    <a:lstStyle/>
+                    <a:p>
+                      <a:pPr algn="ctr">
+                        <a:spcBef>
+                          <a:spcPts val="0"/>
+                        </a:spcBef>
+                        <a:spcAft>
+                          <a:spcPts val="0"/>
+                        </a:spcAft>
+                      </a:pPr>
+                      <a:r>
+                        <a:rPr lang="en-US" sz="700" dirty="0"/>
+                        <a:t>comment[fraction identifier]</a:t>
+                      </a:r>
+                    </a:p>
+                  </a:txBody>
+                  <a:tcPr marL="36000" marR="36000">
+                    <a:solidFill>
+                      <a:schemeClr val="accent3">
+                        <a:lumMod val="75000"/>
+                      </a:schemeClr>
+                    </a:solidFill>
+                  </a:tcPr>
+                </a:tc>
+                <a:tc>
+                  <a:txBody>
+                    <a:bodyPr/>
+                    <a:lstStyle/>
+                    <a:p>
+                      <a:pPr algn="ctr">
+                        <a:spcBef>
+                          <a:spcPts val="0"/>
+                        </a:spcBef>
+                        <a:spcAft>
+                          <a:spcPts val="0"/>
+                        </a:spcAft>
+                      </a:pPr>
+                      <a:r>
+                        <a:rPr lang="en-US" sz="700" dirty="0"/>
+                        <a:t>comment[label]</a:t>
+                      </a:r>
+                    </a:p>
+                  </a:txBody>
+                  <a:tcPr marL="36000" marR="36000">
+                    <a:solidFill>
+                      <a:schemeClr val="accent3">
+                        <a:lumMod val="75000"/>
+                      </a:schemeClr>
+                    </a:solidFill>
+                  </a:tcPr>
+                </a:tc>
+                <a:tc>
+                  <a:txBody>
+                    <a:bodyPr/>
+                    <a:lstStyle/>
+                    <a:p>
+                      <a:pPr algn="ctr">
+                        <a:spcBef>
+                          <a:spcPts val="0"/>
+                        </a:spcBef>
+                        <a:spcAft>
+                          <a:spcPts val="0"/>
+                        </a:spcAft>
+                      </a:pPr>
+                      <a:r>
+                        <a:rPr lang="en-US" sz="700" dirty="0"/>
                         <a:t>comment[data file]</a:t>
                       </a:r>
                     </a:p>
@@ -3615,61 +4324,7 @@
                         </a:spcAft>
                       </a:pPr>
                       <a:r>
-                        <a:rPr lang="en-US" sz="800" dirty="0"/>
-                        <a:t>comment[fraction identifier]</a:t>
-                      </a:r>
-                    </a:p>
-                  </a:txBody>
-                  <a:tcPr marL="36000" marR="36000">
-                    <a:solidFill>
-                      <a:schemeClr val="accent3">
-                        <a:lumMod val="75000"/>
-                      </a:schemeClr>
-                    </a:solidFill>
-                  </a:tcPr>
-                </a:tc>
-                <a:tc>
-                  <a:txBody>
-                    <a:bodyPr/>
-                    <a:lstStyle/>
-                    <a:p>
-                      <a:pPr algn="ctr">
-                        <a:spcBef>
-                          <a:spcPts val="0"/>
-                        </a:spcBef>
-                        <a:spcAft>
-                          <a:spcPts val="0"/>
-                        </a:spcAft>
-                      </a:pPr>
-                      <a:r>
-                        <a:rPr lang="en-US" sz="800" dirty="0"/>
-                        <a:t>comment[label] </a:t>
-                      </a:r>
-                    </a:p>
-                  </a:txBody>
-                  <a:tcPr marL="36000" marR="36000">
-                    <a:solidFill>
-                      <a:schemeClr val="accent3">
-                        <a:lumMod val="75000"/>
-                      </a:schemeClr>
-                    </a:solidFill>
-                  </a:tcPr>
-                </a:tc>
-                <a:tc>
-                  <a:txBody>
-                    <a:bodyPr/>
-                    <a:lstStyle/>
-                    <a:p>
-                      <a:pPr algn="ctr">
-                        <a:spcBef>
-                          <a:spcPts val="0"/>
-                        </a:spcBef>
-                        <a:spcAft>
-                          <a:spcPts val="0"/>
-                        </a:spcAft>
-                      </a:pPr>
-                      <a:r>
-                        <a:rPr lang="en-US" sz="800" dirty="0"/>
+                        <a:rPr lang="en-US" sz="700" dirty="0"/>
                         <a:t>factor value[phenotype]</a:t>
                       </a:r>
                     </a:p>
@@ -3767,7 +4422,7 @@
                       <a:pPr algn="l"/>
                       <a:r>
                         <a:rPr lang="en-US" sz="700" dirty="0"/>
-                        <a:t>fileRAW_Control_F1.raw</a:t>
+                        <a:t>Run 1</a:t>
                       </a:r>
                     </a:p>
                   </a:txBody>
@@ -3795,7 +4450,21 @@
                       <a:pPr algn="l"/>
                       <a:r>
                         <a:rPr lang="en-US" sz="700" dirty="0"/>
-                        <a:t>label-free</a:t>
+                        <a:t>label free</a:t>
+                      </a:r>
+                    </a:p>
+                  </a:txBody>
+                  <a:tcPr anchor="ctr"/>
+                </a:tc>
+                <a:tc>
+                  <a:txBody>
+                    <a:bodyPr/>
+                    <a:lstStyle/>
+                    <a:p>
+                      <a:pPr algn="l"/>
+                      <a:r>
+                        <a:rPr lang="en-US" sz="700" dirty="0"/>
+                        <a:t>fileRAW_Control_F1.raw</a:t>
                       </a:r>
                     </a:p>
                   </a:txBody>
@@ -3913,31 +4582,11 @@
                     <a:bodyPr/>
                     <a:lstStyle/>
                     <a:p>
-                      <a:pPr marL="0" marR="0" lvl="0" indent="0" algn="l" defTabSz="457200" rtl="0" eaLnBrk="1" fontAlgn="auto" latinLnBrk="0" hangingPunct="1">
-                        <a:lnSpc>
-                          <a:spcPct val="100000"/>
-                        </a:lnSpc>
-                        <a:spcBef>
-                          <a:spcPts val="0"/>
-                        </a:spcBef>
-                        <a:spcAft>
-                          <a:spcPts val="0"/>
-                        </a:spcAft>
-                        <a:buClrTx/>
-                        <a:buSzTx/>
-                        <a:buFontTx/>
-                        <a:buNone/>
-                        <a:tabLst/>
-                        <a:defRPr/>
-                      </a:pPr>
+                      <a:pPr algn="l"/>
                       <a:r>
                         <a:rPr lang="en-US" sz="700" dirty="0"/>
-                        <a:t>fileRAW_Tumor_F1.raw</a:t>
+                        <a:t>Run 2</a:t>
                       </a:r>
-                    </a:p>
-                    <a:p>
-                      <a:pPr algn="l"/>
-                      <a:endParaRPr lang="en-US" sz="700" dirty="0"/>
                     </a:p>
                   </a:txBody>
                   <a:tcPr anchor="ctr"/>
@@ -3980,7 +4629,57 @@
                       </a:pPr>
                       <a:r>
                         <a:rPr lang="en-US" sz="700" dirty="0"/>
-                        <a:t>label-free</a:t>
+                        <a:t>label free</a:t>
+                      </a:r>
+                    </a:p>
+                    <a:p>
+                      <a:pPr marL="0" marR="0" lvl="0" indent="0" algn="l" defTabSz="457200" rtl="0" eaLnBrk="1" fontAlgn="auto" latinLnBrk="0" hangingPunct="1">
+                        <a:lnSpc>
+                          <a:spcPct val="100000"/>
+                        </a:lnSpc>
+                        <a:spcBef>
+                          <a:spcPts val="0"/>
+                        </a:spcBef>
+                        <a:spcAft>
+                          <a:spcPts val="0"/>
+                        </a:spcAft>
+                        <a:buClrTx/>
+                        <a:buSzTx/>
+                        <a:buFontTx/>
+                        <a:buNone/>
+                        <a:tabLst/>
+                        <a:defRPr/>
+                      </a:pPr>
+                      <a:endParaRPr lang="en-US" sz="700" dirty="0"/>
+                    </a:p>
+                  </a:txBody>
+                  <a:tcPr anchor="ctr"/>
+                </a:tc>
+                <a:tc>
+                  <a:txBody>
+                    <a:bodyPr/>
+                    <a:lstStyle/>
+                    <a:p>
+                      <a:pPr marL="0" marR="0" lvl="0" indent="0" algn="l" defTabSz="457200" rtl="0" eaLnBrk="1" fontAlgn="auto" latinLnBrk="0" hangingPunct="1">
+                        <a:lnSpc>
+                          <a:spcPct val="100000"/>
+                        </a:lnSpc>
+                        <a:spcBef>
+                          <a:spcPts val="0"/>
+                        </a:spcBef>
+                        <a:spcAft>
+                          <a:spcPts val="0"/>
+                        </a:spcAft>
+                        <a:buClrTx/>
+                        <a:buSzTx/>
+                        <a:buFontTx/>
+                        <a:buNone/>
+                        <a:tabLst/>
+                        <a:defRPr/>
+                      </a:pPr>
+                      <a:r>
+                        <a:rPr lang="en-US" sz="700" dirty="0"/>
+                        <a:t>fileRAW_Tumor_F1.raw</a:t>
                       </a:r>
                     </a:p>
                   </a:txBody>
@@ -4085,7 +4784,17 @@
                     <a:bodyPr/>
                     <a:lstStyle/>
                     <a:p>
-                      <a:endParaRPr lang="en-US" sz="800"/>
+                      <a:endParaRPr lang="en-US" sz="800" dirty="0"/>
+                    </a:p>
+                  </a:txBody>
+                  <a:tcPr/>
+                </a:tc>
+                <a:tc>
+                  <a:txBody>
+                    <a:bodyPr/>
+                    <a:lstStyle/>
+                    <a:p>
+                      <a:endParaRPr lang="en-US" sz="800" dirty="0"/>
                     </a:p>
                   </a:txBody>
                   <a:tcPr/>
@@ -4124,8 +4833,8 @@
         </p:nvSpPr>
         <p:spPr>
           <a:xfrm rot="5400000">
-            <a:off x="2197015" y="-1521956"/>
-            <a:ext cx="165697" cy="4449266"/>
+            <a:off x="1976122" y="-1301063"/>
+            <a:ext cx="165697" cy="4007482"/>
           </a:xfrm>
           <a:prstGeom prst="leftBrace">
             <a:avLst/>
@@ -4203,8 +4912,8 @@
         </p:nvSpPr>
         <p:spPr>
           <a:xfrm rot="5400000">
-            <a:off x="6112368" y="-988042"/>
-            <a:ext cx="165697" cy="3381439"/>
+            <a:off x="5985179" y="-1302634"/>
+            <a:ext cx="165697" cy="4010628"/>
           </a:xfrm>
           <a:prstGeom prst="leftBrace">
             <a:avLst/>
@@ -4247,7 +4956,7 @@
         </p:nvSpPr>
         <p:spPr>
           <a:xfrm>
-            <a:off x="5400529" y="202508"/>
+            <a:off x="5133648" y="216081"/>
             <a:ext cx="1718290" cy="307777"/>
           </a:xfrm>
           <a:prstGeom prst="rect">
@@ -4282,8 +4991,8 @@
         </p:nvSpPr>
         <p:spPr>
           <a:xfrm rot="5400000">
-            <a:off x="8386092" y="119672"/>
-            <a:ext cx="165697" cy="1166011"/>
+            <a:off x="8479794" y="213376"/>
+            <a:ext cx="165697" cy="978604"/>
           </a:xfrm>
           <a:prstGeom prst="leftBrace">
             <a:avLst/>

</xml_diff>